<commit_message>
Added csv metadata para + ...
Added csv metadata para to File Menu User Guide
Some minor User Guide tweaks
</commit_message>
<xml_diff>
--- a/iNZight/img/user_guides/file/File.pptx
+++ b/iNZight/img/user_guides/file/File.pptx
@@ -246,7 +246,7 @@
           <a:p>
             <a:fld id="{F82F713A-5EB9-4B7A-B87D-F2B7940161AF}" type="datetimeFigureOut">
               <a:rPr lang="en-NZ" smtClean="0"/>
-              <a:t>13/04/2020</a:t>
+              <a:t>15/04/2020</a:t>
             </a:fld>
             <a:endParaRPr lang="en-NZ"/>
           </a:p>
@@ -416,7 +416,7 @@
           <a:p>
             <a:fld id="{F82F713A-5EB9-4B7A-B87D-F2B7940161AF}" type="datetimeFigureOut">
               <a:rPr lang="en-NZ" smtClean="0"/>
-              <a:t>13/04/2020</a:t>
+              <a:t>15/04/2020</a:t>
             </a:fld>
             <a:endParaRPr lang="en-NZ"/>
           </a:p>
@@ -596,7 +596,7 @@
           <a:p>
             <a:fld id="{F82F713A-5EB9-4B7A-B87D-F2B7940161AF}" type="datetimeFigureOut">
               <a:rPr lang="en-NZ" smtClean="0"/>
-              <a:t>13/04/2020</a:t>
+              <a:t>15/04/2020</a:t>
             </a:fld>
             <a:endParaRPr lang="en-NZ"/>
           </a:p>
@@ -766,7 +766,7 @@
           <a:p>
             <a:fld id="{F82F713A-5EB9-4B7A-B87D-F2B7940161AF}" type="datetimeFigureOut">
               <a:rPr lang="en-NZ" smtClean="0"/>
-              <a:t>13/04/2020</a:t>
+              <a:t>15/04/2020</a:t>
             </a:fld>
             <a:endParaRPr lang="en-NZ"/>
           </a:p>
@@ -1012,7 +1012,7 @@
           <a:p>
             <a:fld id="{F82F713A-5EB9-4B7A-B87D-F2B7940161AF}" type="datetimeFigureOut">
               <a:rPr lang="en-NZ" smtClean="0"/>
-              <a:t>13/04/2020</a:t>
+              <a:t>15/04/2020</a:t>
             </a:fld>
             <a:endParaRPr lang="en-NZ"/>
           </a:p>
@@ -1244,7 +1244,7 @@
           <a:p>
             <a:fld id="{F82F713A-5EB9-4B7A-B87D-F2B7940161AF}" type="datetimeFigureOut">
               <a:rPr lang="en-NZ" smtClean="0"/>
-              <a:t>13/04/2020</a:t>
+              <a:t>15/04/2020</a:t>
             </a:fld>
             <a:endParaRPr lang="en-NZ"/>
           </a:p>
@@ -1611,7 +1611,7 @@
           <a:p>
             <a:fld id="{F82F713A-5EB9-4B7A-B87D-F2B7940161AF}" type="datetimeFigureOut">
               <a:rPr lang="en-NZ" smtClean="0"/>
-              <a:t>13/04/2020</a:t>
+              <a:t>15/04/2020</a:t>
             </a:fld>
             <a:endParaRPr lang="en-NZ"/>
           </a:p>
@@ -1729,7 +1729,7 @@
           <a:p>
             <a:fld id="{F82F713A-5EB9-4B7A-B87D-F2B7940161AF}" type="datetimeFigureOut">
               <a:rPr lang="en-NZ" smtClean="0"/>
-              <a:t>13/04/2020</a:t>
+              <a:t>15/04/2020</a:t>
             </a:fld>
             <a:endParaRPr lang="en-NZ"/>
           </a:p>
@@ -1824,7 +1824,7 @@
           <a:p>
             <a:fld id="{F82F713A-5EB9-4B7A-B87D-F2B7940161AF}" type="datetimeFigureOut">
               <a:rPr lang="en-NZ" smtClean="0"/>
-              <a:t>13/04/2020</a:t>
+              <a:t>15/04/2020</a:t>
             </a:fld>
             <a:endParaRPr lang="en-NZ"/>
           </a:p>
@@ -2101,7 +2101,7 @@
           <a:p>
             <a:fld id="{F82F713A-5EB9-4B7A-B87D-F2B7940161AF}" type="datetimeFigureOut">
               <a:rPr lang="en-NZ" smtClean="0"/>
-              <a:t>13/04/2020</a:t>
+              <a:t>15/04/2020</a:t>
             </a:fld>
             <a:endParaRPr lang="en-NZ"/>
           </a:p>
@@ -2358,7 +2358,7 @@
           <a:p>
             <a:fld id="{F82F713A-5EB9-4B7A-B87D-F2B7940161AF}" type="datetimeFigureOut">
               <a:rPr lang="en-NZ" smtClean="0"/>
-              <a:t>13/04/2020</a:t>
+              <a:t>15/04/2020</a:t>
             </a:fld>
             <a:endParaRPr lang="en-NZ"/>
           </a:p>
@@ -2571,7 +2571,7 @@
           <a:p>
             <a:fld id="{F82F713A-5EB9-4B7A-B87D-F2B7940161AF}" type="datetimeFigureOut">
               <a:rPr lang="en-NZ" smtClean="0"/>
-              <a:t>13/04/2020</a:t>
+              <a:t>15/04/2020</a:t>
             </a:fld>
             <a:endParaRPr lang="en-NZ"/>
           </a:p>
@@ -3022,7 +3022,7 @@
         </p:blipFill>
         <p:spPr>
           <a:xfrm>
-            <a:off x="4741985" y="164123"/>
+            <a:off x="4763048" y="159727"/>
             <a:ext cx="4869110" cy="4170483"/>
           </a:xfrm>
           <a:prstGeom prst="rect">
@@ -3039,7 +3039,7 @@
           <p:nvPr>
             <p:extLst>
               <p:ext uri="{D42A27DB-BD31-4B8C-83A1-F6EECF244321}">
-                <p14:modId xmlns:p14="http://schemas.microsoft.com/office/powerpoint/2010/main" val="2162807437"/>
+                <p14:modId xmlns:p14="http://schemas.microsoft.com/office/powerpoint/2010/main" val="390573227"/>
               </p:ext>
             </p:extLst>
           </p:nvPr>
@@ -3052,7 +3052,7 @@
           <a:graphicData uri="http://schemas.openxmlformats.org/presentationml/2006/ole">
             <mc:AlternateContent xmlns:mc="http://schemas.openxmlformats.org/markup-compatibility/2006">
               <mc:Choice xmlns:v="urn:schemas-microsoft-com:vml" Requires="v">
-                <p:oleObj spid="_x0000_s1033" r:id="rId5" imgW="17422200" imgH="6209280" progId="">
+                <p:oleObj spid="_x0000_s1036" r:id="rId5" imgW="17422200" imgH="6209280" progId="">
                   <p:embed/>
                 </p:oleObj>
               </mc:Choice>
@@ -3103,7 +3103,7 @@
         </p:blipFill>
         <p:spPr>
           <a:xfrm>
-            <a:off x="205155" y="5210878"/>
+            <a:off x="223877" y="5203061"/>
             <a:ext cx="4436818" cy="1449537"/>
           </a:xfrm>
           <a:prstGeom prst="rect">
@@ -3153,7 +3153,7 @@
           <a:lstStyle/>
           <a:p>
             <a:pPr algn="ctr"/>
-            <a:endParaRPr lang="en-NZ"/>
+            <a:endParaRPr lang="en-NZ" sz="1400"/>
           </a:p>
         </p:txBody>
       </p:sp>
@@ -3236,9 +3236,9 @@
           <p:nvPr/>
         </p:nvCxnSpPr>
         <p:spPr>
-          <a:xfrm flipV="1">
-            <a:off x="441579" y="4495800"/>
-            <a:ext cx="531469" cy="3809"/>
+          <a:xfrm>
+            <a:off x="483577" y="6289431"/>
+            <a:ext cx="353190" cy="1"/>
           </a:xfrm>
           <a:prstGeom prst="straightConnector1">
             <a:avLst/>
@@ -3294,6 +3294,470 @@
           </a:ln>
         </p:spPr>
       </p:pic>
+      <p:sp>
+        <p:nvSpPr>
+          <p:cNvPr id="14" name="TextBox 13"/>
+          <p:cNvSpPr txBox="1"/>
+          <p:nvPr/>
+        </p:nvSpPr>
+        <p:spPr>
+          <a:xfrm>
+            <a:off x="2092569" y="5927830"/>
+            <a:ext cx="1351521" cy="215444"/>
+          </a:xfrm>
+          <a:prstGeom prst="rect">
+            <a:avLst/>
+          </a:prstGeom>
+          <a:noFill/>
+        </p:spPr>
+        <p:txBody>
+          <a:bodyPr wrap="square" rtlCol="0">
+            <a:spAutoFit/>
+          </a:bodyPr>
+          <a:lstStyle/>
+          <a:p>
+            <a:r>
+              <a:rPr lang="en-NZ" sz="800" b="1" i="1" dirty="0" smtClean="0">
+                <a:solidFill>
+                  <a:srgbClr val="C00000"/>
+                </a:solidFill>
+              </a:rPr>
+              <a:t>Type/paste in </a:t>
+            </a:r>
+            <a:r>
+              <a:rPr lang="en-NZ" sz="800" b="1" i="1" dirty="0" err="1" smtClean="0">
+                <a:solidFill>
+                  <a:srgbClr val="C00000"/>
+                </a:solidFill>
+              </a:rPr>
+              <a:t>url</a:t>
+            </a:r>
+            <a:endParaRPr lang="en-NZ" sz="800" b="1" i="1" dirty="0">
+              <a:solidFill>
+                <a:srgbClr val="C00000"/>
+              </a:solidFill>
+            </a:endParaRPr>
+          </a:p>
+        </p:txBody>
+      </p:sp>
+      <p:sp>
+        <p:nvSpPr>
+          <p:cNvPr id="19" name="Oval 18"/>
+          <p:cNvSpPr/>
+          <p:nvPr/>
+        </p:nvSpPr>
+        <p:spPr>
+          <a:xfrm>
+            <a:off x="9086555" y="1339121"/>
+            <a:ext cx="334108" cy="293597"/>
+          </a:xfrm>
+          <a:prstGeom prst="ellipse">
+            <a:avLst/>
+          </a:prstGeom>
+          <a:noFill/>
+          <a:ln w="28575">
+            <a:solidFill>
+              <a:srgbClr val="C00000"/>
+            </a:solidFill>
+          </a:ln>
+        </p:spPr>
+        <p:style>
+          <a:lnRef idx="2">
+            <a:schemeClr val="accent1">
+              <a:shade val="50000"/>
+            </a:schemeClr>
+          </a:lnRef>
+          <a:fillRef idx="1">
+            <a:schemeClr val="accent1"/>
+          </a:fillRef>
+          <a:effectRef idx="0">
+            <a:schemeClr val="accent1"/>
+          </a:effectRef>
+          <a:fontRef idx="minor">
+            <a:schemeClr val="lt1"/>
+          </a:fontRef>
+        </p:style>
+        <p:txBody>
+          <a:bodyPr rtlCol="0" anchor="ctr"/>
+          <a:lstStyle/>
+          <a:p>
+            <a:pPr algn="ctr"/>
+            <a:endParaRPr lang="en-NZ" sz="1200"/>
+          </a:p>
+        </p:txBody>
+      </p:sp>
+      <p:sp>
+        <p:nvSpPr>
+          <p:cNvPr id="20" name="TextBox 19"/>
+          <p:cNvSpPr txBox="1"/>
+          <p:nvPr/>
+        </p:nvSpPr>
+        <p:spPr>
+          <a:xfrm>
+            <a:off x="9097155" y="1294164"/>
+            <a:ext cx="293670" cy="276999"/>
+          </a:xfrm>
+          <a:prstGeom prst="rect">
+            <a:avLst/>
+          </a:prstGeom>
+          <a:noFill/>
+        </p:spPr>
+        <p:txBody>
+          <a:bodyPr wrap="none" rtlCol="0">
+            <a:spAutoFit/>
+          </a:bodyPr>
+          <a:lstStyle/>
+          <a:p>
+            <a:r>
+              <a:rPr lang="en-NZ" sz="1200" b="1" dirty="0" smtClean="0">
+                <a:solidFill>
+                  <a:srgbClr val="C00000"/>
+                </a:solidFill>
+              </a:rPr>
+              <a:t>1</a:t>
+            </a:r>
+            <a:endParaRPr lang="en-NZ" sz="1200" b="1" dirty="0">
+              <a:solidFill>
+                <a:srgbClr val="C00000"/>
+              </a:solidFill>
+            </a:endParaRPr>
+          </a:p>
+        </p:txBody>
+      </p:sp>
+      <p:grpSp>
+        <p:nvGrpSpPr>
+          <p:cNvPr id="21" name="Group 20"/>
+          <p:cNvGrpSpPr/>
+          <p:nvPr/>
+        </p:nvGrpSpPr>
+        <p:grpSpPr>
+          <a:xfrm>
+            <a:off x="9079523" y="766190"/>
+            <a:ext cx="348172" cy="325342"/>
+            <a:chOff x="2151188" y="3165490"/>
+            <a:chExt cx="348172" cy="325342"/>
+          </a:xfrm>
+        </p:grpSpPr>
+        <p:sp>
+          <p:nvSpPr>
+            <p:cNvPr id="22" name="Oval 21"/>
+            <p:cNvSpPr/>
+            <p:nvPr/>
+          </p:nvSpPr>
+          <p:spPr>
+            <a:xfrm>
+              <a:off x="2151188" y="3197235"/>
+              <a:ext cx="334108" cy="293597"/>
+            </a:xfrm>
+            <a:prstGeom prst="ellipse">
+              <a:avLst/>
+            </a:prstGeom>
+            <a:noFill/>
+            <a:ln w="28575">
+              <a:solidFill>
+                <a:srgbClr val="C00000"/>
+              </a:solidFill>
+            </a:ln>
+          </p:spPr>
+          <p:style>
+            <a:lnRef idx="2">
+              <a:schemeClr val="accent1">
+                <a:shade val="50000"/>
+              </a:schemeClr>
+            </a:lnRef>
+            <a:fillRef idx="1">
+              <a:schemeClr val="accent1"/>
+            </a:fillRef>
+            <a:effectRef idx="0">
+              <a:schemeClr val="accent1"/>
+            </a:effectRef>
+            <a:fontRef idx="minor">
+              <a:schemeClr val="lt1"/>
+            </a:fontRef>
+          </p:style>
+          <p:txBody>
+            <a:bodyPr rtlCol="0" anchor="ctr"/>
+            <a:lstStyle/>
+            <a:p>
+              <a:pPr algn="ctr"/>
+              <a:endParaRPr lang="en-NZ" sz="1200"/>
+            </a:p>
+          </p:txBody>
+        </p:sp>
+        <p:sp>
+          <p:nvSpPr>
+            <p:cNvPr id="24" name="TextBox 23"/>
+            <p:cNvSpPr txBox="1"/>
+            <p:nvPr/>
+          </p:nvSpPr>
+          <p:spPr>
+            <a:xfrm>
+              <a:off x="2151188" y="3165490"/>
+              <a:ext cx="348172" cy="276999"/>
+            </a:xfrm>
+            <a:prstGeom prst="rect">
+              <a:avLst/>
+            </a:prstGeom>
+            <a:noFill/>
+          </p:spPr>
+          <p:txBody>
+            <a:bodyPr wrap="square" rtlCol="0">
+              <a:spAutoFit/>
+            </a:bodyPr>
+            <a:lstStyle/>
+            <a:p>
+              <a:r>
+                <a:rPr lang="en-NZ" sz="1200" b="1" dirty="0">
+                  <a:solidFill>
+                    <a:srgbClr val="C00000"/>
+                  </a:solidFill>
+                </a:rPr>
+                <a:t>2</a:t>
+              </a:r>
+            </a:p>
+          </p:txBody>
+        </p:sp>
+      </p:grpSp>
+      <p:cxnSp>
+        <p:nvCxnSpPr>
+          <p:cNvPr id="25" name="Straight Arrow Connector 24"/>
+          <p:cNvCxnSpPr/>
+          <p:nvPr/>
+        </p:nvCxnSpPr>
+        <p:spPr>
+          <a:xfrm flipH="1">
+            <a:off x="8704391" y="1494692"/>
+            <a:ext cx="293076" cy="0"/>
+          </a:xfrm>
+          <a:prstGeom prst="straightConnector1">
+            <a:avLst/>
+          </a:prstGeom>
+          <a:ln w="34925">
+            <a:solidFill>
+              <a:srgbClr val="C00000"/>
+            </a:solidFill>
+            <a:tailEnd type="arrow"/>
+          </a:ln>
+        </p:spPr>
+        <p:style>
+          <a:lnRef idx="1">
+            <a:schemeClr val="accent1"/>
+          </a:lnRef>
+          <a:fillRef idx="0">
+            <a:schemeClr val="accent1"/>
+          </a:fillRef>
+          <a:effectRef idx="0">
+            <a:schemeClr val="accent1"/>
+          </a:effectRef>
+          <a:fontRef idx="minor">
+            <a:schemeClr val="tx1"/>
+          </a:fontRef>
+        </p:style>
+      </p:cxnSp>
+      <p:cxnSp>
+        <p:nvCxnSpPr>
+          <p:cNvPr id="26" name="Straight Arrow Connector 25"/>
+          <p:cNvCxnSpPr/>
+          <p:nvPr/>
+        </p:nvCxnSpPr>
+        <p:spPr>
+          <a:xfrm flipH="1">
+            <a:off x="8669214" y="961294"/>
+            <a:ext cx="293076" cy="0"/>
+          </a:xfrm>
+          <a:prstGeom prst="straightConnector1">
+            <a:avLst/>
+          </a:prstGeom>
+          <a:ln w="34925">
+            <a:solidFill>
+              <a:srgbClr val="C00000"/>
+            </a:solidFill>
+            <a:tailEnd type="arrow"/>
+          </a:ln>
+        </p:spPr>
+        <p:style>
+          <a:lnRef idx="1">
+            <a:schemeClr val="accent1"/>
+          </a:lnRef>
+          <a:fillRef idx="0">
+            <a:schemeClr val="accent1"/>
+          </a:fillRef>
+          <a:effectRef idx="0">
+            <a:schemeClr val="accent1"/>
+          </a:effectRef>
+          <a:fontRef idx="minor">
+            <a:schemeClr val="tx1"/>
+          </a:fontRef>
+        </p:style>
+      </p:cxnSp>
+      <p:sp>
+        <p:nvSpPr>
+          <p:cNvPr id="27" name="Oval 26"/>
+          <p:cNvSpPr/>
+          <p:nvPr/>
+        </p:nvSpPr>
+        <p:spPr>
+          <a:xfrm>
+            <a:off x="310622" y="6176241"/>
+            <a:ext cx="188122" cy="187810"/>
+          </a:xfrm>
+          <a:prstGeom prst="ellipse">
+            <a:avLst/>
+          </a:prstGeom>
+          <a:noFill/>
+          <a:ln w="28575">
+            <a:solidFill>
+              <a:srgbClr val="C00000"/>
+            </a:solidFill>
+          </a:ln>
+        </p:spPr>
+        <p:style>
+          <a:lnRef idx="2">
+            <a:schemeClr val="accent1">
+              <a:shade val="50000"/>
+            </a:schemeClr>
+          </a:lnRef>
+          <a:fillRef idx="1">
+            <a:schemeClr val="accent1"/>
+          </a:fillRef>
+          <a:effectRef idx="0">
+            <a:schemeClr val="accent1"/>
+          </a:effectRef>
+          <a:fontRef idx="minor">
+            <a:schemeClr val="lt1"/>
+          </a:fontRef>
+        </p:style>
+        <p:txBody>
+          <a:bodyPr rtlCol="0" anchor="ctr"/>
+          <a:lstStyle/>
+          <a:p>
+            <a:pPr algn="ctr"/>
+            <a:endParaRPr lang="en-NZ" sz="1200"/>
+          </a:p>
+        </p:txBody>
+      </p:sp>
+      <p:sp>
+        <p:nvSpPr>
+          <p:cNvPr id="28" name="TextBox 27"/>
+          <p:cNvSpPr txBox="1"/>
+          <p:nvPr/>
+        </p:nvSpPr>
+        <p:spPr>
+          <a:xfrm>
+            <a:off x="257848" y="6136677"/>
+            <a:ext cx="293670" cy="276999"/>
+          </a:xfrm>
+          <a:prstGeom prst="rect">
+            <a:avLst/>
+          </a:prstGeom>
+          <a:noFill/>
+        </p:spPr>
+        <p:txBody>
+          <a:bodyPr wrap="none" rtlCol="0">
+            <a:spAutoFit/>
+          </a:bodyPr>
+          <a:lstStyle/>
+          <a:p>
+            <a:r>
+              <a:rPr lang="en-NZ" sz="1200" b="1" dirty="0" smtClean="0">
+                <a:solidFill>
+                  <a:srgbClr val="C00000"/>
+                </a:solidFill>
+              </a:rPr>
+              <a:t>1</a:t>
+            </a:r>
+            <a:endParaRPr lang="en-NZ" sz="1200" b="1" dirty="0">
+              <a:solidFill>
+                <a:srgbClr val="C00000"/>
+              </a:solidFill>
+            </a:endParaRPr>
+          </a:p>
+        </p:txBody>
+      </p:sp>
+      <p:sp>
+        <p:nvSpPr>
+          <p:cNvPr id="29" name="Oval 28"/>
+          <p:cNvSpPr/>
+          <p:nvPr/>
+        </p:nvSpPr>
+        <p:spPr>
+          <a:xfrm>
+            <a:off x="1329997" y="5944310"/>
+            <a:ext cx="188122" cy="187810"/>
+          </a:xfrm>
+          <a:prstGeom prst="ellipse">
+            <a:avLst/>
+          </a:prstGeom>
+          <a:noFill/>
+          <a:ln w="28575">
+            <a:solidFill>
+              <a:srgbClr val="C00000"/>
+            </a:solidFill>
+          </a:ln>
+        </p:spPr>
+        <p:style>
+          <a:lnRef idx="2">
+            <a:schemeClr val="accent1">
+              <a:shade val="50000"/>
+            </a:schemeClr>
+          </a:lnRef>
+          <a:fillRef idx="1">
+            <a:schemeClr val="accent1"/>
+          </a:fillRef>
+          <a:effectRef idx="0">
+            <a:schemeClr val="accent1"/>
+          </a:effectRef>
+          <a:fontRef idx="minor">
+            <a:schemeClr val="lt1"/>
+          </a:fontRef>
+        </p:style>
+        <p:txBody>
+          <a:bodyPr rtlCol="0" anchor="ctr"/>
+          <a:lstStyle/>
+          <a:p>
+            <a:pPr algn="ctr"/>
+            <a:endParaRPr lang="en-NZ" sz="1200"/>
+          </a:p>
+        </p:txBody>
+      </p:sp>
+      <p:sp>
+        <p:nvSpPr>
+          <p:cNvPr id="30" name="TextBox 29"/>
+          <p:cNvSpPr txBox="1"/>
+          <p:nvPr/>
+        </p:nvSpPr>
+        <p:spPr>
+          <a:xfrm>
+            <a:off x="1277223" y="5904746"/>
+            <a:ext cx="293670" cy="276999"/>
+          </a:xfrm>
+          <a:prstGeom prst="rect">
+            <a:avLst/>
+          </a:prstGeom>
+          <a:noFill/>
+        </p:spPr>
+        <p:txBody>
+          <a:bodyPr wrap="none" rtlCol="0">
+            <a:spAutoFit/>
+          </a:bodyPr>
+          <a:lstStyle/>
+          <a:p>
+            <a:r>
+              <a:rPr lang="en-NZ" sz="1200" b="1" dirty="0" smtClean="0">
+                <a:solidFill>
+                  <a:srgbClr val="C00000"/>
+                </a:solidFill>
+              </a:rPr>
+              <a:t>2</a:t>
+            </a:r>
+            <a:endParaRPr lang="en-NZ" sz="1200" b="1" dirty="0">
+              <a:solidFill>
+                <a:srgbClr val="C00000"/>
+              </a:solidFill>
+            </a:endParaRPr>
+          </a:p>
+        </p:txBody>
+      </p:sp>
     </p:spTree>
     <p:extLst>
       <p:ext uri="{BB962C8B-B14F-4D97-AF65-F5344CB8AC3E}">
@@ -3522,11 +3986,6 @@
                 </a:rPr>
                 <a:t>2</a:t>
               </a:r>
-              <a:endParaRPr lang="en-NZ" b="1" dirty="0">
-                <a:solidFill>
-                  <a:srgbClr val="C00000"/>
-                </a:solidFill>
-              </a:endParaRPr>
             </a:p>
           </p:txBody>
         </p:sp>

</xml_diff>